<commit_message>
- Thématique SI - 003 Travail sur le pptx, Ajout des animations sur la partie concernant les flux
</commit_message>
<xml_diff>
--- a/thématique SI/003 Comprendre Sys santé/rsrc/ecosystème_medical.pptx
+++ b/thématique SI/003 Comprendre Sys santé/rsrc/ecosystème_medical.pptx
@@ -104,6 +104,11 @@
       </a:defRPr>
     </a:lvl9pPr>
   </p:defaultTextStyle>
+  <p:extLst>
+    <p:ext uri="{EFAFB233-063F-42B5-8137-9DF3F51BA10A}">
+      <p15:sldGuideLst xmlns:p15="http://schemas.microsoft.com/office/powerpoint/2012/main"/>
+    </p:ext>
+  </p:extLst>
 </p:presentation>
 </file>
 
@@ -254,7 +259,7 @@
           <a:p>
             <a:fld id="{2C0F9DBF-F362-3449-81A1-7AD104BABC2D}" type="datetimeFigureOut">
               <a:rPr lang="fr-FR" smtClean="0"/>
-              <a:t>15/05/2023</a:t>
+              <a:t>17/05/2023</a:t>
             </a:fld>
             <a:endParaRPr lang="fr-FR"/>
           </a:p>
@@ -452,7 +457,7 @@
           <a:p>
             <a:fld id="{2C0F9DBF-F362-3449-81A1-7AD104BABC2D}" type="datetimeFigureOut">
               <a:rPr lang="fr-FR" smtClean="0"/>
-              <a:t>15/05/2023</a:t>
+              <a:t>17/05/2023</a:t>
             </a:fld>
             <a:endParaRPr lang="fr-FR"/>
           </a:p>
@@ -660,7 +665,7 @@
           <a:p>
             <a:fld id="{2C0F9DBF-F362-3449-81A1-7AD104BABC2D}" type="datetimeFigureOut">
               <a:rPr lang="fr-FR" smtClean="0"/>
-              <a:t>15/05/2023</a:t>
+              <a:t>17/05/2023</a:t>
             </a:fld>
             <a:endParaRPr lang="fr-FR"/>
           </a:p>
@@ -858,7 +863,7 @@
           <a:p>
             <a:fld id="{2C0F9DBF-F362-3449-81A1-7AD104BABC2D}" type="datetimeFigureOut">
               <a:rPr lang="fr-FR" smtClean="0"/>
-              <a:t>15/05/2023</a:t>
+              <a:t>17/05/2023</a:t>
             </a:fld>
             <a:endParaRPr lang="fr-FR"/>
           </a:p>
@@ -1133,7 +1138,7 @@
           <a:p>
             <a:fld id="{2C0F9DBF-F362-3449-81A1-7AD104BABC2D}" type="datetimeFigureOut">
               <a:rPr lang="fr-FR" smtClean="0"/>
-              <a:t>15/05/2023</a:t>
+              <a:t>17/05/2023</a:t>
             </a:fld>
             <a:endParaRPr lang="fr-FR"/>
           </a:p>
@@ -1398,7 +1403,7 @@
           <a:p>
             <a:fld id="{2C0F9DBF-F362-3449-81A1-7AD104BABC2D}" type="datetimeFigureOut">
               <a:rPr lang="fr-FR" smtClean="0"/>
-              <a:t>15/05/2023</a:t>
+              <a:t>17/05/2023</a:t>
             </a:fld>
             <a:endParaRPr lang="fr-FR"/>
           </a:p>
@@ -1810,7 +1815,7 @@
           <a:p>
             <a:fld id="{2C0F9DBF-F362-3449-81A1-7AD104BABC2D}" type="datetimeFigureOut">
               <a:rPr lang="fr-FR" smtClean="0"/>
-              <a:t>15/05/2023</a:t>
+              <a:t>17/05/2023</a:t>
             </a:fld>
             <a:endParaRPr lang="fr-FR"/>
           </a:p>
@@ -1951,7 +1956,7 @@
           <a:p>
             <a:fld id="{2C0F9DBF-F362-3449-81A1-7AD104BABC2D}" type="datetimeFigureOut">
               <a:rPr lang="fr-FR" smtClean="0"/>
-              <a:t>15/05/2023</a:t>
+              <a:t>17/05/2023</a:t>
             </a:fld>
             <a:endParaRPr lang="fr-FR"/>
           </a:p>
@@ -2064,7 +2069,7 @@
           <a:p>
             <a:fld id="{2C0F9DBF-F362-3449-81A1-7AD104BABC2D}" type="datetimeFigureOut">
               <a:rPr lang="fr-FR" smtClean="0"/>
-              <a:t>15/05/2023</a:t>
+              <a:t>17/05/2023</a:t>
             </a:fld>
             <a:endParaRPr lang="fr-FR"/>
           </a:p>
@@ -2375,7 +2380,7 @@
           <a:p>
             <a:fld id="{2C0F9DBF-F362-3449-81A1-7AD104BABC2D}" type="datetimeFigureOut">
               <a:rPr lang="fr-FR" smtClean="0"/>
-              <a:t>15/05/2023</a:t>
+              <a:t>17/05/2023</a:t>
             </a:fld>
             <a:endParaRPr lang="fr-FR"/>
           </a:p>
@@ -2663,7 +2668,7 @@
           <a:p>
             <a:fld id="{2C0F9DBF-F362-3449-81A1-7AD104BABC2D}" type="datetimeFigureOut">
               <a:rPr lang="fr-FR" smtClean="0"/>
-              <a:t>15/05/2023</a:t>
+              <a:t>17/05/2023</a:t>
             </a:fld>
             <a:endParaRPr lang="fr-FR"/>
           </a:p>
@@ -2904,7 +2909,7 @@
           <a:p>
             <a:fld id="{2C0F9DBF-F362-3449-81A1-7AD104BABC2D}" type="datetimeFigureOut">
               <a:rPr lang="fr-FR" smtClean="0"/>
-              <a:t>15/05/2023</a:t>
+              <a:t>17/05/2023</a:t>
             </a:fld>
             <a:endParaRPr lang="fr-FR"/>
           </a:p>
@@ -3336,7 +3341,7 @@
         <p:spPr>
           <a:xfrm>
             <a:off x="8060951" y="5007489"/>
-            <a:ext cx="2807546" cy="1758918"/>
+            <a:ext cx="2807546" cy="1681483"/>
           </a:xfrm>
           <a:prstGeom prst="roundRect">
             <a:avLst/>
@@ -3361,160 +3366,231 @@
           <a:bodyPr lIns="0" tIns="0" rIns="0" bIns="0" rtlCol="0" anchor="ctr" anchorCtr="1"/>
           <a:lstStyle/>
           <a:p>
+            <a:pPr>
+              <a:tabLst>
+                <a:tab pos="324000" algn="l"/>
+              </a:tabLst>
+            </a:pPr>
             <a:r>
               <a:rPr lang="fr-FR" sz="600" b="1" dirty="0"/>
-              <a:t>ANSM</a:t>
+              <a:t>ANSM	</a:t>
             </a:r>
             <a:r>
               <a:rPr lang="fr-FR" sz="600" dirty="0"/>
-              <a:t> Agence Nationale de Sécurité du Médicament et des Produits de santé</a:t>
+              <a:t>Agence Nationale de Sécurité du Médicament et des produits de santé</a:t>
             </a:r>
             <a:endParaRPr lang="fr-FR" sz="600" b="1" dirty="0"/>
           </a:p>
           <a:p>
+            <a:pPr>
+              <a:tabLst>
+                <a:tab pos="324000" algn="l"/>
+              </a:tabLst>
+            </a:pPr>
             <a:r>
               <a:rPr lang="fr-FR" sz="600" b="1" dirty="0"/>
-              <a:t>ARIIS</a:t>
+              <a:t>ARIIS	</a:t>
             </a:r>
             <a:r>
               <a:rPr lang="fr-FR" sz="600" dirty="0"/>
-              <a:t> Alliance pour la Recherche et l'Innovation des Industries de Santé</a:t>
+              <a:t>Alliance pour la Recherche et l'Innovation des Industries de Santé</a:t>
             </a:r>
             <a:endParaRPr lang="fr-FR" sz="600" b="1" dirty="0"/>
           </a:p>
           <a:p>
+            <a:pPr>
+              <a:tabLst>
+                <a:tab pos="324000" algn="l"/>
+              </a:tabLst>
+            </a:pPr>
             <a:r>
               <a:rPr lang="fr-FR" sz="600" b="1" dirty="0"/>
-              <a:t>ARS</a:t>
+              <a:t>ARS	</a:t>
             </a:r>
             <a:r>
               <a:rPr lang="fr-FR" sz="600" dirty="0"/>
-              <a:t> Agence Régionale de Santé</a:t>
+              <a:t>Agence Régionale de Santé</a:t>
             </a:r>
           </a:p>
           <a:p>
+            <a:pPr>
+              <a:tabLst>
+                <a:tab pos="324000" algn="l"/>
+              </a:tabLst>
+            </a:pPr>
             <a:r>
               <a:rPr lang="fr-FR" sz="600" b="1" dirty="0"/>
-              <a:t>BCMD </a:t>
+              <a:t>BCMD	</a:t>
             </a:r>
             <a:r>
               <a:rPr lang="fr-FR" sz="600" dirty="0"/>
-              <a:t>Base des Causes Médicales de décès</a:t>
+              <a:t>Base des Causes Médicales de Décès</a:t>
             </a:r>
           </a:p>
           <a:p>
+            <a:pPr>
+              <a:tabLst>
+                <a:tab pos="324000" algn="l"/>
+              </a:tabLst>
+            </a:pPr>
             <a:r>
               <a:rPr lang="fr-FR" sz="600" b="1" dirty="0"/>
-              <a:t>CEA</a:t>
+              <a:t>CEA	</a:t>
             </a:r>
             <a:r>
               <a:rPr lang="fr-FR" sz="600" dirty="0"/>
-              <a:t> Commissariat à l'Energie Atomique </a:t>
+              <a:t>Commissariat à l'Energie Atomique </a:t>
             </a:r>
           </a:p>
           <a:p>
+            <a:pPr>
+              <a:tabLst>
+                <a:tab pos="324000" algn="l"/>
+              </a:tabLst>
+            </a:pPr>
             <a:r>
               <a:rPr lang="fr-FR" sz="600" b="1" dirty="0"/>
               <a:t>CNIL</a:t>
             </a:r>
             <a:r>
               <a:rPr lang="fr-FR" sz="600" dirty="0"/>
-              <a:t> Commission Nationale de l'Informatique et des Libertés</a:t>
+              <a:t>	Commission Nationale de l'Informatique et des Libertés</a:t>
             </a:r>
           </a:p>
           <a:p>
+            <a:pPr>
+              <a:tabLst>
+                <a:tab pos="324000" algn="l"/>
+              </a:tabLst>
+            </a:pPr>
             <a:r>
               <a:rPr lang="fr-FR" sz="600" b="1" dirty="0"/>
               <a:t>CSIS</a:t>
             </a:r>
             <a:r>
               <a:rPr lang="fr-FR" sz="600" dirty="0"/>
-              <a:t>     Conseil Stratégique des Industries de Santé</a:t>
+              <a:t>	Conseil Stratégique des Industries de Santé</a:t>
             </a:r>
           </a:p>
           <a:p>
+            <a:pPr>
+              <a:tabLst>
+                <a:tab pos="324000" algn="l"/>
+              </a:tabLst>
+            </a:pPr>
+            <a:r>
+              <a:rPr lang="fr-FR" sz="600" b="1" dirty="0"/>
+              <a:t>DIM</a:t>
+            </a:r>
             <a:r>
               <a:rPr lang="fr-FR" sz="600" dirty="0"/>
-              <a:t>DIM Direction de l'Information Médicale</a:t>
+              <a:t>	Direction de l'Information Médicale</a:t>
             </a:r>
           </a:p>
           <a:p>
+            <a:pPr>
+              <a:tabLst>
+                <a:tab pos="324000" algn="l"/>
+              </a:tabLst>
+            </a:pPr>
             <a:r>
               <a:rPr lang="fr-FR" sz="600" b="1" dirty="0"/>
               <a:t>DGOS</a:t>
             </a:r>
             <a:r>
               <a:rPr lang="fr-FR" sz="600" dirty="0"/>
-              <a:t> Direction Générale de l'Offre de Soin</a:t>
+              <a:t>	Direction Générale de l'Offre de Soin</a:t>
             </a:r>
           </a:p>
           <a:p>
+            <a:pPr>
+              <a:tabLst>
+                <a:tab pos="324000" algn="l"/>
+              </a:tabLst>
+            </a:pPr>
             <a:r>
               <a:rPr lang="fr-FR" sz="600" b="1" dirty="0"/>
               <a:t>DRCI</a:t>
             </a:r>
             <a:r>
               <a:rPr lang="fr-FR" sz="600" dirty="0"/>
-              <a:t> Délégation à la Recherche Clinique et à l'Innovation</a:t>
+              <a:t>	Délégation à la Recherche Clinique et à l'Innovation</a:t>
             </a:r>
           </a:p>
           <a:p>
+            <a:pPr>
+              <a:tabLst>
+                <a:tab pos="324000" algn="l"/>
+              </a:tabLst>
+            </a:pPr>
             <a:r>
               <a:rPr lang="fr-FR" sz="600" b="1" dirty="0"/>
               <a:t>HAS</a:t>
             </a:r>
             <a:r>
               <a:rPr lang="fr-FR" sz="600" dirty="0"/>
-              <a:t> Haute Autorité de Santé</a:t>
+              <a:t>	Haute Autorité de Santé</a:t>
             </a:r>
           </a:p>
           <a:p>
+            <a:pPr>
+              <a:tabLst>
+                <a:tab pos="324000" algn="l"/>
+              </a:tabLst>
+            </a:pPr>
             <a:r>
               <a:rPr lang="fr-FR" sz="600" b="1" dirty="0"/>
               <a:t>INRIA</a:t>
             </a:r>
             <a:r>
               <a:rPr lang="fr-FR" sz="600" dirty="0"/>
-              <a:t> Institut National de Recherche en Informatique et en Automatique</a:t>
+              <a:t>	Institut National de Recherche en Informatique et en Automatique</a:t>
             </a:r>
           </a:p>
           <a:p>
+            <a:pPr>
+              <a:tabLst>
+                <a:tab pos="324000" algn="l"/>
+              </a:tabLst>
+            </a:pPr>
             <a:r>
               <a:rPr lang="fr-FR" sz="600" b="1" dirty="0"/>
               <a:t>PMSI</a:t>
             </a:r>
             <a:r>
               <a:rPr lang="fr-FR" sz="600" dirty="0"/>
-              <a:t> Programme de médicalisation des systèmes d'</a:t>
+              <a:t>	Programme de Médicalisation des Systèmes d'Information</a:t>
             </a:r>
-            <a:r>
-              <a:rPr lang="fr-FR" sz="600" dirty="0" err="1"/>
-              <a:t>indformation</a:t>
-            </a:r>
-            <a:endParaRPr lang="fr-FR" sz="600" dirty="0"/>
           </a:p>
           <a:p>
+            <a:pPr>
+              <a:tabLst>
+                <a:tab pos="324000" algn="l"/>
+              </a:tabLst>
+            </a:pPr>
             <a:r>
               <a:rPr lang="fr-FR" sz="600" b="1" dirty="0"/>
               <a:t>SNDS</a:t>
             </a:r>
             <a:r>
               <a:rPr lang="fr-FR" sz="600" dirty="0"/>
-              <a:t> Système National des Données de Santé</a:t>
+              <a:t>	Système National des Données de Santé</a:t>
             </a:r>
           </a:p>
           <a:p>
+            <a:pPr>
+              <a:tabLst>
+                <a:tab pos="324000" algn="l"/>
+              </a:tabLst>
+            </a:pPr>
             <a:r>
               <a:rPr lang="fr-FR" sz="600" b="1" dirty="0"/>
               <a:t>SNIIRAM</a:t>
             </a:r>
             <a:r>
               <a:rPr lang="fr-FR" sz="600" dirty="0"/>
-              <a:t> Système national d’information inter-régimes de l’Assurance maladie</a:t>
+              <a:t>	Système National d’Information Inter-Régimes de l’Assurance Maladie</a:t>
             </a:r>
-          </a:p>
-          <a:p>
-            <a:endParaRPr lang="fr-FR" sz="600" dirty="0"/>
           </a:p>
         </p:txBody>
       </p:sp>
@@ -5117,7 +5193,7 @@
             <p:spPr>
               <a:xfrm>
                 <a:off x="2228850" y="2153174"/>
-                <a:ext cx="972000" cy="860028"/>
+                <a:ext cx="972000" cy="968400"/>
               </a:xfrm>
               <a:prstGeom prst="ellipse">
                 <a:avLst/>
@@ -6006,7 +6082,11 @@
             <a:p>
               <a:pPr algn="ctr"/>
               <a:r>
-                <a:rPr lang="fr-FR" sz="700" dirty="0"/>
+                <a:rPr lang="fr-FR" sz="700" dirty="0">
+                  <a:solidFill>
+                    <a:schemeClr val="tx1"/>
+                  </a:solidFill>
+                </a:rPr>
                 <a:t>Fournisseur de dispositif médical</a:t>
               </a:r>
             </a:p>
@@ -6026,9 +6106,9 @@
           </p:nvGrpSpPr>
           <p:grpSpPr>
             <a:xfrm>
-              <a:off x="5548304" y="5347391"/>
+              <a:off x="5548304" y="5398283"/>
               <a:ext cx="379304" cy="358898"/>
-              <a:chOff x="5524435" y="5361333"/>
+              <a:chOff x="5524435" y="5429393"/>
               <a:chExt cx="507252" cy="479963"/>
             </a:xfrm>
           </p:grpSpPr>
@@ -6048,7 +6128,7 @@
             </p:nvSpPr>
             <p:spPr>
               <a:xfrm>
-                <a:off x="5524435" y="5361333"/>
+                <a:off x="5524435" y="5429393"/>
                 <a:ext cx="507252" cy="479963"/>
               </a:xfrm>
               <a:prstGeom prst="ellipse">
@@ -6114,8 +6194,8 @@
             </p:blipFill>
             <p:spPr>
               <a:xfrm>
-                <a:off x="5625762" y="5455132"/>
-                <a:ext cx="327646" cy="327646"/>
+                <a:off x="5625763" y="5523193"/>
+                <a:ext cx="327645" cy="327646"/>
               </a:xfrm>
               <a:prstGeom prst="rect">
                 <a:avLst/>
@@ -6137,7 +6217,7 @@
           </p:nvSpPr>
           <p:spPr>
             <a:xfrm>
-              <a:off x="4850204" y="5719663"/>
+              <a:off x="4850204" y="5770557"/>
               <a:ext cx="1852589" cy="162776"/>
             </a:xfrm>
             <a:prstGeom prst="roundRect">
@@ -9165,13 +9245,14 @@
             </p:cNvPr>
             <p:cNvCxnSpPr>
               <a:cxnSpLocks/>
+              <a:endCxn id="32" idx="2"/>
             </p:cNvCxnSpPr>
             <p:nvPr/>
           </p:nvCxnSpPr>
           <p:spPr>
             <a:xfrm flipV="1">
-              <a:off x="4807701" y="5601599"/>
-              <a:ext cx="634909" cy="6623"/>
+              <a:off x="4732942" y="5577732"/>
+              <a:ext cx="815362" cy="2109"/>
             </a:xfrm>
             <a:prstGeom prst="straightConnector1">
               <a:avLst/>
@@ -9211,14 +9292,15 @@
             </p:cNvPr>
             <p:cNvCxnSpPr>
               <a:cxnSpLocks/>
+              <a:stCxn id="32" idx="6"/>
               <a:endCxn id="187" idx="1"/>
             </p:cNvCxnSpPr>
             <p:nvPr/>
           </p:nvCxnSpPr>
           <p:spPr>
-            <a:xfrm flipV="1">
-              <a:off x="6016616" y="5584663"/>
-              <a:ext cx="630661" cy="8031"/>
+            <a:xfrm>
+              <a:off x="5927608" y="5577732"/>
+              <a:ext cx="719669" cy="6931"/>
             </a:xfrm>
             <a:prstGeom prst="straightConnector1">
               <a:avLst/>
@@ -9258,13 +9340,14 @@
             </p:cNvPr>
             <p:cNvCxnSpPr>
               <a:cxnSpLocks/>
+              <a:stCxn id="187" idx="3"/>
             </p:cNvCxnSpPr>
             <p:nvPr/>
           </p:nvCxnSpPr>
           <p:spPr>
             <a:xfrm>
-              <a:off x="7453689" y="5591566"/>
-              <a:ext cx="3483777" cy="23929"/>
+              <a:off x="7361956" y="5584663"/>
+              <a:ext cx="3575510" cy="30832"/>
             </a:xfrm>
             <a:prstGeom prst="straightConnector1">
               <a:avLst/>
@@ -9866,7 +9949,7 @@
             </p:nvSpPr>
             <p:spPr>
               <a:xfrm>
-                <a:off x="5658149" y="1676891"/>
+                <a:off x="5742032" y="1676891"/>
                 <a:ext cx="358467" cy="339183"/>
               </a:xfrm>
               <a:prstGeom prst="ellipse">
@@ -10223,8 +10306,8 @@
             </p:nvCxnSpPr>
             <p:spPr>
               <a:xfrm flipH="1">
-                <a:off x="6016616" y="1846483"/>
-                <a:ext cx="171441" cy="0"/>
+                <a:off x="6100499" y="1846483"/>
+                <a:ext cx="87558" cy="0"/>
               </a:xfrm>
               <a:prstGeom prst="line">
                 <a:avLst/>
@@ -13067,7 +13150,11 @@
             <a:p>
               <a:pPr algn="ctr"/>
               <a:r>
-                <a:rPr lang="fr-FR" sz="600" dirty="0"/>
+                <a:rPr lang="fr-FR" sz="600" dirty="0">
+                  <a:solidFill>
+                    <a:schemeClr val="tx1"/>
+                  </a:solidFill>
+                </a:rPr>
                 <a:t>Outil de suivi des stocks</a:t>
               </a:r>
             </a:p>
@@ -15064,7 +15151,7 @@
           </p:nvSpPr>
           <p:spPr>
             <a:xfrm>
-              <a:off x="4991067" y="5515838"/>
+              <a:off x="4991067" y="5461311"/>
               <a:ext cx="176039" cy="176039"/>
             </a:xfrm>
             <a:prstGeom prst="ellipse">
@@ -15389,7 +15476,7 @@
           </p:nvSpPr>
           <p:spPr>
             <a:xfrm>
-              <a:off x="7331446" y="1837407"/>
+              <a:off x="7331446" y="1761910"/>
               <a:ext cx="176039" cy="176039"/>
             </a:xfrm>
             <a:prstGeom prst="ellipse">
@@ -15454,7 +15541,7 @@
           </p:nvSpPr>
           <p:spPr>
             <a:xfrm>
-              <a:off x="7168921" y="2126874"/>
+              <a:off x="7319911" y="2126874"/>
               <a:ext cx="176039" cy="176039"/>
             </a:xfrm>
             <a:prstGeom prst="ellipse">
@@ -16803,10 +16890,10 @@
       </p:grpSp>
       <p:grpSp>
         <p:nvGrpSpPr>
-          <p:cNvPr id="1734" name="Groupe 1733">
+          <p:cNvPr id="3" name="Groupe 2">
             <a:extLst>
               <a:ext uri="{FF2B5EF4-FFF2-40B4-BE49-F238E27FC236}">
-                <a16:creationId xmlns:a16="http://schemas.microsoft.com/office/drawing/2014/main" id="{50A1D335-69EB-E77F-3086-D9CC0AD5393F}"/>
+                <a16:creationId xmlns:a16="http://schemas.microsoft.com/office/drawing/2014/main" id="{64FD779C-C3D6-B7C2-E069-A90B861233DC}"/>
               </a:ext>
             </a:extLst>
           </p:cNvPr>
@@ -16815,18 +16902,18 @@
         </p:nvGrpSpPr>
         <p:grpSpPr>
           <a:xfrm>
-            <a:off x="6452234" y="5624745"/>
-            <a:ext cx="1527606" cy="853822"/>
-            <a:chOff x="4861406" y="5219658"/>
-            <a:chExt cx="1527606" cy="853822"/>
+            <a:off x="6382247" y="5414032"/>
+            <a:ext cx="1597593" cy="1064535"/>
+            <a:chOff x="6382247" y="5414032"/>
+            <a:chExt cx="1597593" cy="1064535"/>
           </a:xfrm>
         </p:grpSpPr>
         <p:grpSp>
           <p:nvGrpSpPr>
-            <p:cNvPr id="1715" name="Groupe 1714">
-              <a:extLst>
-                <a:ext uri="{FF2B5EF4-FFF2-40B4-BE49-F238E27FC236}">
-                  <a16:creationId xmlns:a16="http://schemas.microsoft.com/office/drawing/2014/main" id="{43090D63-9673-D47B-9B1B-004C100AA777}"/>
+            <p:cNvPr id="1734" name="Groupe 1733">
+              <a:extLst>
+                <a:ext uri="{FF2B5EF4-FFF2-40B4-BE49-F238E27FC236}">
+                  <a16:creationId xmlns:a16="http://schemas.microsoft.com/office/drawing/2014/main" id="{50A1D335-69EB-E77F-3086-D9CC0AD5393F}"/>
                 </a:ext>
               </a:extLst>
             </p:cNvPr>
@@ -16835,986 +16922,1063 @@
           </p:nvGrpSpPr>
           <p:grpSpPr>
             <a:xfrm>
-              <a:off x="5561543" y="5665035"/>
-              <a:ext cx="811442" cy="184903"/>
-              <a:chOff x="4446125" y="5742731"/>
-              <a:chExt cx="811442" cy="184903"/>
+              <a:off x="6452234" y="5624745"/>
+              <a:ext cx="1527606" cy="853822"/>
+              <a:chOff x="4861406" y="5219658"/>
+              <a:chExt cx="1527606" cy="853822"/>
             </a:xfrm>
           </p:grpSpPr>
-          <p:sp>
-            <p:nvSpPr>
-              <p:cNvPr id="1693" name="Ellipse 1692">
+          <p:grpSp>
+            <p:nvGrpSpPr>
+              <p:cNvPr id="1715" name="Groupe 1714">
                 <a:extLst>
                   <a:ext uri="{FF2B5EF4-FFF2-40B4-BE49-F238E27FC236}">
-                    <a16:creationId xmlns:a16="http://schemas.microsoft.com/office/drawing/2014/main" id="{9B308FBA-2264-B555-1CFA-D8E22BC9C93E}"/>
+                    <a16:creationId xmlns:a16="http://schemas.microsoft.com/office/drawing/2014/main" id="{43090D63-9673-D47B-9B1B-004C100AA777}"/>
                   </a:ext>
                 </a:extLst>
               </p:cNvPr>
-              <p:cNvSpPr/>
+              <p:cNvGrpSpPr/>
               <p:nvPr/>
-            </p:nvSpPr>
-            <p:spPr>
+            </p:nvGrpSpPr>
+            <p:grpSpPr>
               <a:xfrm>
-                <a:off x="4446125" y="5742731"/>
-                <a:ext cx="176039" cy="176039"/>
+                <a:off x="5561543" y="5665035"/>
+                <a:ext cx="811442" cy="184903"/>
+                <a:chOff x="4446125" y="5742731"/>
+                <a:chExt cx="811442" cy="184903"/>
               </a:xfrm>
-              <a:prstGeom prst="ellipse">
-                <a:avLst/>
-              </a:prstGeom>
-              <a:solidFill>
-                <a:schemeClr val="bg1"/>
-              </a:solidFill>
-              <a:ln>
+            </p:grpSpPr>
+            <p:sp>
+              <p:nvSpPr>
+                <p:cNvPr id="1693" name="Ellipse 1692">
+                  <a:extLst>
+                    <a:ext uri="{FF2B5EF4-FFF2-40B4-BE49-F238E27FC236}">
+                      <a16:creationId xmlns:a16="http://schemas.microsoft.com/office/drawing/2014/main" id="{9B308FBA-2264-B555-1CFA-D8E22BC9C93E}"/>
+                    </a:ext>
+                  </a:extLst>
+                </p:cNvPr>
+                <p:cNvSpPr/>
+                <p:nvPr/>
+              </p:nvSpPr>
+              <p:spPr>
+                <a:xfrm>
+                  <a:off x="4446125" y="5742731"/>
+                  <a:ext cx="176039" cy="176039"/>
+                </a:xfrm>
+                <a:prstGeom prst="ellipse">
+                  <a:avLst/>
+                </a:prstGeom>
                 <a:solidFill>
-                  <a:schemeClr val="bg1">
-                    <a:lumMod val="50000"/>
+                  <a:schemeClr val="bg1"/>
+                </a:solidFill>
+                <a:ln>
+                  <a:solidFill>
+                    <a:schemeClr val="bg1">
+                      <a:lumMod val="50000"/>
+                    </a:schemeClr>
+                  </a:solidFill>
+                </a:ln>
+              </p:spPr>
+              <p:style>
+                <a:lnRef idx="2">
+                  <a:schemeClr val="accent1">
+                    <a:shade val="50000"/>
                   </a:schemeClr>
-                </a:solidFill>
-              </a:ln>
-            </p:spPr>
-            <p:style>
-              <a:lnRef idx="2">
-                <a:schemeClr val="accent1">
-                  <a:shade val="50000"/>
-                </a:schemeClr>
-              </a:lnRef>
-              <a:fillRef idx="1">
-                <a:schemeClr val="accent1"/>
-              </a:fillRef>
-              <a:effectRef idx="0">
-                <a:schemeClr val="accent1"/>
-              </a:effectRef>
-              <a:fontRef idx="minor">
-                <a:schemeClr val="lt1"/>
-              </a:fontRef>
-            </p:style>
-            <p:txBody>
-              <a:bodyPr lIns="0" tIns="0" rIns="0" bIns="0" rtlCol="0" anchor="ctr"/>
-              <a:lstStyle/>
-              <a:p>
-                <a:pPr algn="ctr"/>
-                <a:r>
-                  <a:rPr lang="fr-FR" sz="1200" dirty="0">
-                    <a:solidFill>
-                      <a:schemeClr val="bg1">
-                        <a:lumMod val="50000"/>
-                      </a:schemeClr>
-                    </a:solidFill>
-                  </a:rPr>
-                  <a:t>€</a:t>
-                </a:r>
-              </a:p>
-            </p:txBody>
-          </p:sp>
-          <p:sp>
-            <p:nvSpPr>
-              <p:cNvPr id="1706" name="Rectangle 1705">
+                </a:lnRef>
+                <a:fillRef idx="1">
+                  <a:schemeClr val="accent1"/>
+                </a:fillRef>
+                <a:effectRef idx="0">
+                  <a:schemeClr val="accent1"/>
+                </a:effectRef>
+                <a:fontRef idx="minor">
+                  <a:schemeClr val="lt1"/>
+                </a:fontRef>
+              </p:style>
+              <p:txBody>
+                <a:bodyPr lIns="0" tIns="0" rIns="0" bIns="0" rtlCol="0" anchor="ctr"/>
+                <a:lstStyle/>
+                <a:p>
+                  <a:pPr algn="ctr"/>
+                  <a:r>
+                    <a:rPr lang="fr-FR" sz="1200" dirty="0">
+                      <a:solidFill>
+                        <a:schemeClr val="bg1">
+                          <a:lumMod val="50000"/>
+                        </a:schemeClr>
+                      </a:solidFill>
+                    </a:rPr>
+                    <a:t>€</a:t>
+                  </a:r>
+                </a:p>
+              </p:txBody>
+            </p:sp>
+            <p:sp>
+              <p:nvSpPr>
+                <p:cNvPr id="1706" name="Rectangle 1705">
+                  <a:extLst>
+                    <a:ext uri="{FF2B5EF4-FFF2-40B4-BE49-F238E27FC236}">
+                      <a16:creationId xmlns:a16="http://schemas.microsoft.com/office/drawing/2014/main" id="{BFD8E634-A5A2-4F21-206D-8D4AF3CE7508}"/>
+                    </a:ext>
+                  </a:extLst>
+                </p:cNvPr>
+                <p:cNvSpPr/>
+                <p:nvPr/>
+              </p:nvSpPr>
+              <p:spPr>
+                <a:xfrm>
+                  <a:off x="4584104" y="5754275"/>
+                  <a:ext cx="673463" cy="173359"/>
+                </a:xfrm>
+                <a:prstGeom prst="rect">
+                  <a:avLst/>
+                </a:prstGeom>
+                <a:noFill/>
+                <a:ln>
+                  <a:noFill/>
+                </a:ln>
+              </p:spPr>
+              <p:style>
+                <a:lnRef idx="2">
+                  <a:schemeClr val="accent1">
+                    <a:shade val="50000"/>
+                  </a:schemeClr>
+                </a:lnRef>
+                <a:fillRef idx="1">
+                  <a:schemeClr val="accent1"/>
+                </a:fillRef>
+                <a:effectRef idx="0">
+                  <a:schemeClr val="accent1"/>
+                </a:effectRef>
+                <a:fontRef idx="minor">
+                  <a:schemeClr val="lt1"/>
+                </a:fontRef>
+              </p:style>
+              <p:txBody>
+                <a:bodyPr rtlCol="0" anchor="ctr"/>
+                <a:lstStyle/>
+                <a:p>
+                  <a:r>
+                    <a:rPr lang="fr-FR" sz="800" dirty="0">
+                      <a:solidFill>
+                        <a:srgbClr val="002060"/>
+                      </a:solidFill>
+                    </a:rPr>
+                    <a:t>Finance</a:t>
+                  </a:r>
+                </a:p>
+              </p:txBody>
+            </p:sp>
+          </p:grpSp>
+          <p:grpSp>
+            <p:nvGrpSpPr>
+              <p:cNvPr id="1716" name="Groupe 1715">
                 <a:extLst>
                   <a:ext uri="{FF2B5EF4-FFF2-40B4-BE49-F238E27FC236}">
-                    <a16:creationId xmlns:a16="http://schemas.microsoft.com/office/drawing/2014/main" id="{BFD8E634-A5A2-4F21-206D-8D4AF3CE7508}"/>
+                    <a16:creationId xmlns:a16="http://schemas.microsoft.com/office/drawing/2014/main" id="{6B33F252-4037-2911-6022-4DFC25E6B4DD}"/>
                   </a:ext>
                 </a:extLst>
               </p:cNvPr>
-              <p:cNvSpPr/>
+              <p:cNvGrpSpPr/>
               <p:nvPr/>
-            </p:nvSpPr>
-            <p:spPr>
+            </p:nvGrpSpPr>
+            <p:grpSpPr>
               <a:xfrm>
-                <a:off x="4584104" y="5754275"/>
-                <a:ext cx="673463" cy="173359"/>
+                <a:off x="4864618" y="5221832"/>
+                <a:ext cx="811442" cy="184903"/>
+                <a:chOff x="4446125" y="5742731"/>
+                <a:chExt cx="811442" cy="184903"/>
               </a:xfrm>
-              <a:prstGeom prst="rect">
-                <a:avLst/>
-              </a:prstGeom>
-              <a:noFill/>
-              <a:ln>
+            </p:grpSpPr>
+            <p:sp>
+              <p:nvSpPr>
+                <p:cNvPr id="1717" name="Ellipse 1716">
+                  <a:extLst>
+                    <a:ext uri="{FF2B5EF4-FFF2-40B4-BE49-F238E27FC236}">
+                      <a16:creationId xmlns:a16="http://schemas.microsoft.com/office/drawing/2014/main" id="{DA569855-7536-2867-EBBA-519F24E6C3DE}"/>
+                    </a:ext>
+                  </a:extLst>
+                </p:cNvPr>
+                <p:cNvSpPr/>
+                <p:nvPr/>
+              </p:nvSpPr>
+              <p:spPr>
+                <a:xfrm>
+                  <a:off x="4446125" y="5742731"/>
+                  <a:ext cx="176039" cy="176039"/>
+                </a:xfrm>
+                <a:prstGeom prst="ellipse">
+                  <a:avLst/>
+                </a:prstGeom>
+                <a:solidFill>
+                  <a:schemeClr val="bg1"/>
+                </a:solidFill>
+                <a:ln>
+                  <a:solidFill>
+                    <a:schemeClr val="bg1">
+                      <a:lumMod val="50000"/>
+                    </a:schemeClr>
+                  </a:solidFill>
+                </a:ln>
+              </p:spPr>
+              <p:style>
+                <a:lnRef idx="2">
+                  <a:schemeClr val="accent1">
+                    <a:shade val="50000"/>
+                  </a:schemeClr>
+                </a:lnRef>
+                <a:fillRef idx="1">
+                  <a:schemeClr val="accent1"/>
+                </a:fillRef>
+                <a:effectRef idx="0">
+                  <a:schemeClr val="accent1"/>
+                </a:effectRef>
+                <a:fontRef idx="minor">
+                  <a:schemeClr val="lt1"/>
+                </a:fontRef>
+              </p:style>
+              <p:txBody>
+                <a:bodyPr lIns="0" tIns="0" rIns="0" bIns="0" rtlCol="0" anchor="ctr"/>
+                <a:lstStyle/>
+                <a:p>
+                  <a:pPr algn="ctr"/>
+                  <a:r>
+                    <a:rPr lang="fr-FR" sz="1200" dirty="0">
+                      <a:solidFill>
+                        <a:schemeClr val="bg1">
+                          <a:lumMod val="50000"/>
+                        </a:schemeClr>
+                      </a:solidFill>
+                    </a:rPr>
+                    <a:t>A</a:t>
+                  </a:r>
+                </a:p>
+              </p:txBody>
+            </p:sp>
+            <p:sp>
+              <p:nvSpPr>
+                <p:cNvPr id="1718" name="Rectangle 1717">
+                  <a:extLst>
+                    <a:ext uri="{FF2B5EF4-FFF2-40B4-BE49-F238E27FC236}">
+                      <a16:creationId xmlns:a16="http://schemas.microsoft.com/office/drawing/2014/main" id="{25961D43-4828-DC52-FC94-DB9308627732}"/>
+                    </a:ext>
+                  </a:extLst>
+                </p:cNvPr>
+                <p:cNvSpPr/>
+                <p:nvPr/>
+              </p:nvSpPr>
+              <p:spPr>
+                <a:xfrm>
+                  <a:off x="4584104" y="5754275"/>
+                  <a:ext cx="673463" cy="173359"/>
+                </a:xfrm>
+                <a:prstGeom prst="rect">
+                  <a:avLst/>
+                </a:prstGeom>
                 <a:noFill/>
-              </a:ln>
-            </p:spPr>
-            <p:style>
-              <a:lnRef idx="2">
-                <a:schemeClr val="accent1">
-                  <a:shade val="50000"/>
-                </a:schemeClr>
-              </a:lnRef>
-              <a:fillRef idx="1">
-                <a:schemeClr val="accent1"/>
-              </a:fillRef>
-              <a:effectRef idx="0">
-                <a:schemeClr val="accent1"/>
-              </a:effectRef>
-              <a:fontRef idx="minor">
-                <a:schemeClr val="lt1"/>
-              </a:fontRef>
-            </p:style>
-            <p:txBody>
-              <a:bodyPr rtlCol="0" anchor="ctr"/>
-              <a:lstStyle/>
-              <a:p>
-                <a:r>
-                  <a:rPr lang="fr-FR" sz="800" dirty="0">
-                    <a:solidFill>
-                      <a:srgbClr val="002060"/>
-                    </a:solidFill>
-                  </a:rPr>
-                  <a:t>Finance</a:t>
-                </a:r>
-              </a:p>
-            </p:txBody>
-          </p:sp>
-        </p:grpSp>
-        <p:grpSp>
-          <p:nvGrpSpPr>
-            <p:cNvPr id="1716" name="Groupe 1715">
-              <a:extLst>
-                <a:ext uri="{FF2B5EF4-FFF2-40B4-BE49-F238E27FC236}">
-                  <a16:creationId xmlns:a16="http://schemas.microsoft.com/office/drawing/2014/main" id="{6B33F252-4037-2911-6022-4DFC25E6B4DD}"/>
-                </a:ext>
-              </a:extLst>
-            </p:cNvPr>
-            <p:cNvGrpSpPr/>
-            <p:nvPr/>
-          </p:nvGrpSpPr>
-          <p:grpSpPr>
-            <a:xfrm>
-              <a:off x="4864618" y="5221832"/>
-              <a:ext cx="811442" cy="184903"/>
-              <a:chOff x="4446125" y="5742731"/>
-              <a:chExt cx="811442" cy="184903"/>
-            </a:xfrm>
-          </p:grpSpPr>
-          <p:sp>
-            <p:nvSpPr>
-              <p:cNvPr id="1717" name="Ellipse 1716">
+                <a:ln>
+                  <a:noFill/>
+                </a:ln>
+              </p:spPr>
+              <p:style>
+                <a:lnRef idx="2">
+                  <a:schemeClr val="accent1">
+                    <a:shade val="50000"/>
+                  </a:schemeClr>
+                </a:lnRef>
+                <a:fillRef idx="1">
+                  <a:schemeClr val="accent1"/>
+                </a:fillRef>
+                <a:effectRef idx="0">
+                  <a:schemeClr val="accent1"/>
+                </a:effectRef>
+                <a:fontRef idx="minor">
+                  <a:schemeClr val="lt1"/>
+                </a:fontRef>
+              </p:style>
+              <p:txBody>
+                <a:bodyPr rtlCol="0" anchor="ctr"/>
+                <a:lstStyle/>
+                <a:p>
+                  <a:r>
+                    <a:rPr lang="fr-FR" sz="800" dirty="0">
+                      <a:solidFill>
+                        <a:srgbClr val="002060"/>
+                      </a:solidFill>
+                    </a:rPr>
+                    <a:t>Audit</a:t>
+                  </a:r>
+                </a:p>
+              </p:txBody>
+            </p:sp>
+          </p:grpSp>
+          <p:grpSp>
+            <p:nvGrpSpPr>
+              <p:cNvPr id="1719" name="Groupe 1718">
                 <a:extLst>
                   <a:ext uri="{FF2B5EF4-FFF2-40B4-BE49-F238E27FC236}">
-                    <a16:creationId xmlns:a16="http://schemas.microsoft.com/office/drawing/2014/main" id="{DA569855-7536-2867-EBBA-519F24E6C3DE}"/>
+                    <a16:creationId xmlns:a16="http://schemas.microsoft.com/office/drawing/2014/main" id="{42181DA6-7194-41B2-F997-BED748CD4767}"/>
                   </a:ext>
                 </a:extLst>
               </p:cNvPr>
-              <p:cNvSpPr/>
+              <p:cNvGrpSpPr/>
               <p:nvPr/>
-            </p:nvSpPr>
-            <p:spPr>
+            </p:nvGrpSpPr>
+            <p:grpSpPr>
               <a:xfrm>
-                <a:off x="4446125" y="5742731"/>
-                <a:ext cx="176039" cy="176039"/>
+                <a:off x="4861406" y="5444080"/>
+                <a:ext cx="811442" cy="184903"/>
+                <a:chOff x="4446125" y="5742731"/>
+                <a:chExt cx="811442" cy="184903"/>
               </a:xfrm>
-              <a:prstGeom prst="ellipse">
-                <a:avLst/>
-              </a:prstGeom>
-              <a:solidFill>
-                <a:schemeClr val="bg1"/>
-              </a:solidFill>
-              <a:ln>
+            </p:grpSpPr>
+            <p:sp>
+              <p:nvSpPr>
+                <p:cNvPr id="1720" name="Ellipse 1719">
+                  <a:extLst>
+                    <a:ext uri="{FF2B5EF4-FFF2-40B4-BE49-F238E27FC236}">
+                      <a16:creationId xmlns:a16="http://schemas.microsoft.com/office/drawing/2014/main" id="{5AEBAAE9-FB4C-7921-A779-3E8F615F0951}"/>
+                    </a:ext>
+                  </a:extLst>
+                </p:cNvPr>
+                <p:cNvSpPr/>
+                <p:nvPr/>
+              </p:nvSpPr>
+              <p:spPr>
+                <a:xfrm>
+                  <a:off x="4446125" y="5742731"/>
+                  <a:ext cx="176039" cy="176039"/>
+                </a:xfrm>
+                <a:prstGeom prst="ellipse">
+                  <a:avLst/>
+                </a:prstGeom>
                 <a:solidFill>
-                  <a:schemeClr val="bg1">
-                    <a:lumMod val="50000"/>
+                  <a:schemeClr val="bg1"/>
+                </a:solidFill>
+                <a:ln>
+                  <a:solidFill>
+                    <a:schemeClr val="bg1">
+                      <a:lumMod val="50000"/>
+                    </a:schemeClr>
+                  </a:solidFill>
+                </a:ln>
+              </p:spPr>
+              <p:style>
+                <a:lnRef idx="2">
+                  <a:schemeClr val="accent1">
+                    <a:shade val="50000"/>
                   </a:schemeClr>
-                </a:solidFill>
-              </a:ln>
-            </p:spPr>
-            <p:style>
-              <a:lnRef idx="2">
-                <a:schemeClr val="accent1">
-                  <a:shade val="50000"/>
-                </a:schemeClr>
-              </a:lnRef>
-              <a:fillRef idx="1">
-                <a:schemeClr val="accent1"/>
-              </a:fillRef>
-              <a:effectRef idx="0">
-                <a:schemeClr val="accent1"/>
-              </a:effectRef>
-              <a:fontRef idx="minor">
-                <a:schemeClr val="lt1"/>
-              </a:fontRef>
-            </p:style>
-            <p:txBody>
-              <a:bodyPr lIns="0" tIns="0" rIns="0" bIns="0" rtlCol="0" anchor="ctr"/>
-              <a:lstStyle/>
-              <a:p>
-                <a:pPr algn="ctr"/>
-                <a:r>
-                  <a:rPr lang="fr-FR" sz="1200" dirty="0">
-                    <a:solidFill>
-                      <a:schemeClr val="bg1">
-                        <a:lumMod val="50000"/>
-                      </a:schemeClr>
-                    </a:solidFill>
-                  </a:rPr>
-                  <a:t>A</a:t>
-                </a:r>
-              </a:p>
-            </p:txBody>
-          </p:sp>
-          <p:sp>
-            <p:nvSpPr>
-              <p:cNvPr id="1718" name="Rectangle 1717">
+                </a:lnRef>
+                <a:fillRef idx="1">
+                  <a:schemeClr val="accent1"/>
+                </a:fillRef>
+                <a:effectRef idx="0">
+                  <a:schemeClr val="accent1"/>
+                </a:effectRef>
+                <a:fontRef idx="minor">
+                  <a:schemeClr val="lt1"/>
+                </a:fontRef>
+              </p:style>
+              <p:txBody>
+                <a:bodyPr lIns="0" tIns="0" rIns="0" bIns="0" rtlCol="0" anchor="ctr"/>
+                <a:lstStyle/>
+                <a:p>
+                  <a:pPr algn="ctr"/>
+                  <a:r>
+                    <a:rPr lang="fr-FR" sz="1200" dirty="0">
+                      <a:solidFill>
+                        <a:schemeClr val="bg1">
+                          <a:lumMod val="50000"/>
+                        </a:schemeClr>
+                      </a:solidFill>
+                    </a:rPr>
+                    <a:t>D</a:t>
+                  </a:r>
+                </a:p>
+              </p:txBody>
+            </p:sp>
+            <p:sp>
+              <p:nvSpPr>
+                <p:cNvPr id="1721" name="Rectangle 1720">
+                  <a:extLst>
+                    <a:ext uri="{FF2B5EF4-FFF2-40B4-BE49-F238E27FC236}">
+                      <a16:creationId xmlns:a16="http://schemas.microsoft.com/office/drawing/2014/main" id="{38B0F28E-323A-D99A-B90C-4B424244C358}"/>
+                    </a:ext>
+                  </a:extLst>
+                </p:cNvPr>
+                <p:cNvSpPr/>
+                <p:nvPr/>
+              </p:nvSpPr>
+              <p:spPr>
+                <a:xfrm>
+                  <a:off x="4584104" y="5754275"/>
+                  <a:ext cx="673463" cy="173359"/>
+                </a:xfrm>
+                <a:prstGeom prst="rect">
+                  <a:avLst/>
+                </a:prstGeom>
+                <a:noFill/>
+                <a:ln>
+                  <a:noFill/>
+                </a:ln>
+              </p:spPr>
+              <p:style>
+                <a:lnRef idx="2">
+                  <a:schemeClr val="accent1">
+                    <a:shade val="50000"/>
+                  </a:schemeClr>
+                </a:lnRef>
+                <a:fillRef idx="1">
+                  <a:schemeClr val="accent1"/>
+                </a:fillRef>
+                <a:effectRef idx="0">
+                  <a:schemeClr val="accent1"/>
+                </a:effectRef>
+                <a:fontRef idx="minor">
+                  <a:schemeClr val="lt1"/>
+                </a:fontRef>
+              </p:style>
+              <p:txBody>
+                <a:bodyPr rtlCol="0" anchor="ctr"/>
+                <a:lstStyle/>
+                <a:p>
+                  <a:r>
+                    <a:rPr lang="fr-FR" sz="800" dirty="0">
+                      <a:solidFill>
+                        <a:srgbClr val="002060"/>
+                      </a:solidFill>
+                    </a:rPr>
+                    <a:t>Données</a:t>
+                  </a:r>
+                </a:p>
+              </p:txBody>
+            </p:sp>
+          </p:grpSp>
+          <p:grpSp>
+            <p:nvGrpSpPr>
+              <p:cNvPr id="1722" name="Groupe 1721">
                 <a:extLst>
                   <a:ext uri="{FF2B5EF4-FFF2-40B4-BE49-F238E27FC236}">
-                    <a16:creationId xmlns:a16="http://schemas.microsoft.com/office/drawing/2014/main" id="{25961D43-4828-DC52-FC94-DB9308627732}"/>
+                    <a16:creationId xmlns:a16="http://schemas.microsoft.com/office/drawing/2014/main" id="{7DAF258B-2D86-6380-3C30-E2BC3F01E00F}"/>
                   </a:ext>
                 </a:extLst>
               </p:cNvPr>
-              <p:cNvSpPr/>
+              <p:cNvGrpSpPr/>
               <p:nvPr/>
-            </p:nvSpPr>
-            <p:spPr>
+            </p:nvGrpSpPr>
+            <p:grpSpPr>
               <a:xfrm>
-                <a:off x="4584104" y="5754275"/>
-                <a:ext cx="673463" cy="173359"/>
+                <a:off x="4861406" y="5666328"/>
+                <a:ext cx="811442" cy="184903"/>
+                <a:chOff x="4446125" y="5742731"/>
+                <a:chExt cx="811442" cy="184903"/>
               </a:xfrm>
-              <a:prstGeom prst="rect">
-                <a:avLst/>
-              </a:prstGeom>
-              <a:noFill/>
-              <a:ln>
+            </p:grpSpPr>
+            <p:sp>
+              <p:nvSpPr>
+                <p:cNvPr id="1723" name="Ellipse 1722">
+                  <a:extLst>
+                    <a:ext uri="{FF2B5EF4-FFF2-40B4-BE49-F238E27FC236}">
+                      <a16:creationId xmlns:a16="http://schemas.microsoft.com/office/drawing/2014/main" id="{1020FE9C-F255-4324-E8FC-D5B2186A9D63}"/>
+                    </a:ext>
+                  </a:extLst>
+                </p:cNvPr>
+                <p:cNvSpPr/>
+                <p:nvPr/>
+              </p:nvSpPr>
+              <p:spPr>
+                <a:xfrm>
+                  <a:off x="4446125" y="5742731"/>
+                  <a:ext cx="176039" cy="176039"/>
+                </a:xfrm>
+                <a:prstGeom prst="ellipse">
+                  <a:avLst/>
+                </a:prstGeom>
+                <a:solidFill>
+                  <a:schemeClr val="bg1"/>
+                </a:solidFill>
+                <a:ln>
+                  <a:solidFill>
+                    <a:schemeClr val="bg1">
+                      <a:lumMod val="50000"/>
+                    </a:schemeClr>
+                  </a:solidFill>
+                </a:ln>
+              </p:spPr>
+              <p:style>
+                <a:lnRef idx="2">
+                  <a:schemeClr val="accent1">
+                    <a:shade val="50000"/>
+                  </a:schemeClr>
+                </a:lnRef>
+                <a:fillRef idx="1">
+                  <a:schemeClr val="accent1"/>
+                </a:fillRef>
+                <a:effectRef idx="0">
+                  <a:schemeClr val="accent1"/>
+                </a:effectRef>
+                <a:fontRef idx="minor">
+                  <a:schemeClr val="lt1"/>
+                </a:fontRef>
+              </p:style>
+              <p:txBody>
+                <a:bodyPr lIns="0" tIns="0" rIns="0" bIns="0" rtlCol="0" anchor="ctr"/>
+                <a:lstStyle/>
+                <a:p>
+                  <a:pPr algn="ctr"/>
+                  <a:r>
+                    <a:rPr lang="fr-FR" sz="1200" dirty="0">
+                      <a:solidFill>
+                        <a:schemeClr val="bg1">
+                          <a:lumMod val="50000"/>
+                        </a:schemeClr>
+                      </a:solidFill>
+                    </a:rPr>
+                    <a:t>G</a:t>
+                  </a:r>
+                </a:p>
+              </p:txBody>
+            </p:sp>
+            <p:sp>
+              <p:nvSpPr>
+                <p:cNvPr id="1724" name="Rectangle 1723">
+                  <a:extLst>
+                    <a:ext uri="{FF2B5EF4-FFF2-40B4-BE49-F238E27FC236}">
+                      <a16:creationId xmlns:a16="http://schemas.microsoft.com/office/drawing/2014/main" id="{9C0E7EF3-F058-0955-96C0-BD5C0077FAE3}"/>
+                    </a:ext>
+                  </a:extLst>
+                </p:cNvPr>
+                <p:cNvSpPr/>
+                <p:nvPr/>
+              </p:nvSpPr>
+              <p:spPr>
+                <a:xfrm>
+                  <a:off x="4584104" y="5754275"/>
+                  <a:ext cx="673463" cy="173359"/>
+                </a:xfrm>
+                <a:prstGeom prst="rect">
+                  <a:avLst/>
+                </a:prstGeom>
                 <a:noFill/>
-              </a:ln>
-            </p:spPr>
-            <p:style>
-              <a:lnRef idx="2">
-                <a:schemeClr val="accent1">
-                  <a:shade val="50000"/>
-                </a:schemeClr>
-              </a:lnRef>
-              <a:fillRef idx="1">
-                <a:schemeClr val="accent1"/>
-              </a:fillRef>
-              <a:effectRef idx="0">
-                <a:schemeClr val="accent1"/>
-              </a:effectRef>
-              <a:fontRef idx="minor">
-                <a:schemeClr val="lt1"/>
-              </a:fontRef>
-            </p:style>
-            <p:txBody>
-              <a:bodyPr rtlCol="0" anchor="ctr"/>
-              <a:lstStyle/>
-              <a:p>
-                <a:r>
-                  <a:rPr lang="fr-FR" sz="800" dirty="0">
-                    <a:solidFill>
-                      <a:srgbClr val="002060"/>
-                    </a:solidFill>
-                  </a:rPr>
-                  <a:t>Audit</a:t>
-                </a:r>
-              </a:p>
-            </p:txBody>
-          </p:sp>
-        </p:grpSp>
-        <p:grpSp>
-          <p:nvGrpSpPr>
-            <p:cNvPr id="1719" name="Groupe 1718">
-              <a:extLst>
-                <a:ext uri="{FF2B5EF4-FFF2-40B4-BE49-F238E27FC236}">
-                  <a16:creationId xmlns:a16="http://schemas.microsoft.com/office/drawing/2014/main" id="{42181DA6-7194-41B2-F997-BED748CD4767}"/>
-                </a:ext>
-              </a:extLst>
-            </p:cNvPr>
-            <p:cNvGrpSpPr/>
-            <p:nvPr/>
-          </p:nvGrpSpPr>
-          <p:grpSpPr>
-            <a:xfrm>
-              <a:off x="4861406" y="5444080"/>
-              <a:ext cx="811442" cy="184903"/>
-              <a:chOff x="4446125" y="5742731"/>
-              <a:chExt cx="811442" cy="184903"/>
-            </a:xfrm>
-          </p:grpSpPr>
-          <p:sp>
-            <p:nvSpPr>
-              <p:cNvPr id="1720" name="Ellipse 1719">
+                <a:ln>
+                  <a:noFill/>
+                </a:ln>
+              </p:spPr>
+              <p:style>
+                <a:lnRef idx="2">
+                  <a:schemeClr val="accent1">
+                    <a:shade val="50000"/>
+                  </a:schemeClr>
+                </a:lnRef>
+                <a:fillRef idx="1">
+                  <a:schemeClr val="accent1"/>
+                </a:fillRef>
+                <a:effectRef idx="0">
+                  <a:schemeClr val="accent1"/>
+                </a:effectRef>
+                <a:fontRef idx="minor">
+                  <a:schemeClr val="lt1"/>
+                </a:fontRef>
+              </p:style>
+              <p:txBody>
+                <a:bodyPr rtlCol="0" anchor="ctr"/>
+                <a:lstStyle/>
+                <a:p>
+                  <a:r>
+                    <a:rPr lang="fr-FR" sz="800" dirty="0">
+                      <a:solidFill>
+                        <a:srgbClr val="002060"/>
+                      </a:solidFill>
+                    </a:rPr>
+                    <a:t>Gestion</a:t>
+                  </a:r>
+                </a:p>
+              </p:txBody>
+            </p:sp>
+          </p:grpSp>
+          <p:grpSp>
+            <p:nvGrpSpPr>
+              <p:cNvPr id="1725" name="Groupe 1724">
                 <a:extLst>
                   <a:ext uri="{FF2B5EF4-FFF2-40B4-BE49-F238E27FC236}">
-                    <a16:creationId xmlns:a16="http://schemas.microsoft.com/office/drawing/2014/main" id="{5AEBAAE9-FB4C-7921-A779-3E8F615F0951}"/>
+                    <a16:creationId xmlns:a16="http://schemas.microsoft.com/office/drawing/2014/main" id="{27CBF04C-A11A-63EE-0787-EC0192FC77A6}"/>
                   </a:ext>
                 </a:extLst>
               </p:cNvPr>
-              <p:cNvSpPr/>
+              <p:cNvGrpSpPr/>
               <p:nvPr/>
-            </p:nvSpPr>
-            <p:spPr>
+            </p:nvGrpSpPr>
+            <p:grpSpPr>
               <a:xfrm>
-                <a:off x="4446125" y="5742731"/>
-                <a:ext cx="176039" cy="176039"/>
+                <a:off x="4862167" y="5888577"/>
+                <a:ext cx="811442" cy="184903"/>
+                <a:chOff x="4446125" y="5742731"/>
+                <a:chExt cx="811442" cy="184903"/>
               </a:xfrm>
-              <a:prstGeom prst="ellipse">
-                <a:avLst/>
-              </a:prstGeom>
-              <a:solidFill>
-                <a:schemeClr val="bg1"/>
-              </a:solidFill>
-              <a:ln>
+            </p:grpSpPr>
+            <p:sp>
+              <p:nvSpPr>
+                <p:cNvPr id="1726" name="Ellipse 1725">
+                  <a:extLst>
+                    <a:ext uri="{FF2B5EF4-FFF2-40B4-BE49-F238E27FC236}">
+                      <a16:creationId xmlns:a16="http://schemas.microsoft.com/office/drawing/2014/main" id="{B9032987-3C1F-CFAB-57BC-6A02B5DDAA79}"/>
+                    </a:ext>
+                  </a:extLst>
+                </p:cNvPr>
+                <p:cNvSpPr/>
+                <p:nvPr/>
+              </p:nvSpPr>
+              <p:spPr>
+                <a:xfrm>
+                  <a:off x="4446125" y="5742731"/>
+                  <a:ext cx="176039" cy="176039"/>
+                </a:xfrm>
+                <a:prstGeom prst="ellipse">
+                  <a:avLst/>
+                </a:prstGeom>
                 <a:solidFill>
-                  <a:schemeClr val="bg1">
-                    <a:lumMod val="50000"/>
+                  <a:schemeClr val="bg1"/>
+                </a:solidFill>
+                <a:ln>
+                  <a:solidFill>
+                    <a:schemeClr val="bg1">
+                      <a:lumMod val="50000"/>
+                    </a:schemeClr>
+                  </a:solidFill>
+                </a:ln>
+              </p:spPr>
+              <p:style>
+                <a:lnRef idx="2">
+                  <a:schemeClr val="accent1">
+                    <a:shade val="50000"/>
                   </a:schemeClr>
-                </a:solidFill>
-              </a:ln>
-            </p:spPr>
-            <p:style>
-              <a:lnRef idx="2">
-                <a:schemeClr val="accent1">
-                  <a:shade val="50000"/>
-                </a:schemeClr>
-              </a:lnRef>
-              <a:fillRef idx="1">
-                <a:schemeClr val="accent1"/>
-              </a:fillRef>
-              <a:effectRef idx="0">
-                <a:schemeClr val="accent1"/>
-              </a:effectRef>
-              <a:fontRef idx="minor">
-                <a:schemeClr val="lt1"/>
-              </a:fontRef>
-            </p:style>
-            <p:txBody>
-              <a:bodyPr lIns="0" tIns="0" rIns="0" bIns="0" rtlCol="0" anchor="ctr"/>
-              <a:lstStyle/>
-              <a:p>
-                <a:pPr algn="ctr"/>
-                <a:r>
-                  <a:rPr lang="fr-FR" sz="1200" dirty="0">
-                    <a:solidFill>
-                      <a:schemeClr val="bg1">
-                        <a:lumMod val="50000"/>
-                      </a:schemeClr>
-                    </a:solidFill>
-                  </a:rPr>
-                  <a:t>D</a:t>
-                </a:r>
-              </a:p>
-            </p:txBody>
-          </p:sp>
-          <p:sp>
-            <p:nvSpPr>
-              <p:cNvPr id="1721" name="Rectangle 1720">
+                </a:lnRef>
+                <a:fillRef idx="1">
+                  <a:schemeClr val="accent1"/>
+                </a:fillRef>
+                <a:effectRef idx="0">
+                  <a:schemeClr val="accent1"/>
+                </a:effectRef>
+                <a:fontRef idx="minor">
+                  <a:schemeClr val="lt1"/>
+                </a:fontRef>
+              </p:style>
+              <p:txBody>
+                <a:bodyPr lIns="0" tIns="0" rIns="0" bIns="0" rtlCol="0" anchor="ctr"/>
+                <a:lstStyle/>
+                <a:p>
+                  <a:pPr algn="ctr"/>
+                  <a:r>
+                    <a:rPr lang="fr-FR" sz="1200" dirty="0">
+                      <a:solidFill>
+                        <a:schemeClr val="bg1">
+                          <a:lumMod val="50000"/>
+                        </a:schemeClr>
+                      </a:solidFill>
+                    </a:rPr>
+                    <a:t>I</a:t>
+                  </a:r>
+                </a:p>
+              </p:txBody>
+            </p:sp>
+            <p:sp>
+              <p:nvSpPr>
+                <p:cNvPr id="1727" name="Rectangle 1726">
+                  <a:extLst>
+                    <a:ext uri="{FF2B5EF4-FFF2-40B4-BE49-F238E27FC236}">
+                      <a16:creationId xmlns:a16="http://schemas.microsoft.com/office/drawing/2014/main" id="{CC343B79-8594-DF92-C703-96C7E1AD2337}"/>
+                    </a:ext>
+                  </a:extLst>
+                </p:cNvPr>
+                <p:cNvSpPr/>
+                <p:nvPr/>
+              </p:nvSpPr>
+              <p:spPr>
+                <a:xfrm>
+                  <a:off x="4584104" y="5754275"/>
+                  <a:ext cx="673463" cy="173359"/>
+                </a:xfrm>
+                <a:prstGeom prst="rect">
+                  <a:avLst/>
+                </a:prstGeom>
+                <a:noFill/>
+                <a:ln>
+                  <a:noFill/>
+                </a:ln>
+              </p:spPr>
+              <p:style>
+                <a:lnRef idx="2">
+                  <a:schemeClr val="accent1">
+                    <a:shade val="50000"/>
+                  </a:schemeClr>
+                </a:lnRef>
+                <a:fillRef idx="1">
+                  <a:schemeClr val="accent1"/>
+                </a:fillRef>
+                <a:effectRef idx="0">
+                  <a:schemeClr val="accent1"/>
+                </a:effectRef>
+                <a:fontRef idx="minor">
+                  <a:schemeClr val="lt1"/>
+                </a:fontRef>
+              </p:style>
+              <p:txBody>
+                <a:bodyPr rtlCol="0" anchor="ctr"/>
+                <a:lstStyle/>
+                <a:p>
+                  <a:r>
+                    <a:rPr lang="fr-FR" sz="800" dirty="0">
+                      <a:solidFill>
+                        <a:srgbClr val="002060"/>
+                      </a:solidFill>
+                    </a:rPr>
+                    <a:t>Influence</a:t>
+                  </a:r>
+                </a:p>
+              </p:txBody>
+            </p:sp>
+          </p:grpSp>
+          <p:grpSp>
+            <p:nvGrpSpPr>
+              <p:cNvPr id="1728" name="Groupe 1727">
                 <a:extLst>
                   <a:ext uri="{FF2B5EF4-FFF2-40B4-BE49-F238E27FC236}">
-                    <a16:creationId xmlns:a16="http://schemas.microsoft.com/office/drawing/2014/main" id="{38B0F28E-323A-D99A-B90C-4B424244C358}"/>
+                    <a16:creationId xmlns:a16="http://schemas.microsoft.com/office/drawing/2014/main" id="{A514F01E-BEBA-83A6-E9DC-A66599FB2411}"/>
                   </a:ext>
                 </a:extLst>
               </p:cNvPr>
-              <p:cNvSpPr/>
+              <p:cNvGrpSpPr/>
               <p:nvPr/>
-            </p:nvSpPr>
-            <p:spPr>
+            </p:nvGrpSpPr>
+            <p:grpSpPr>
               <a:xfrm>
-                <a:off x="4584104" y="5754275"/>
-                <a:ext cx="673463" cy="173359"/>
+                <a:off x="5577570" y="5219658"/>
+                <a:ext cx="811442" cy="184903"/>
+                <a:chOff x="4446125" y="5742731"/>
+                <a:chExt cx="811442" cy="184903"/>
               </a:xfrm>
-              <a:prstGeom prst="rect">
-                <a:avLst/>
-              </a:prstGeom>
-              <a:noFill/>
-              <a:ln>
+            </p:grpSpPr>
+            <p:sp>
+              <p:nvSpPr>
+                <p:cNvPr id="1729" name="Ellipse 1728">
+                  <a:extLst>
+                    <a:ext uri="{FF2B5EF4-FFF2-40B4-BE49-F238E27FC236}">
+                      <a16:creationId xmlns:a16="http://schemas.microsoft.com/office/drawing/2014/main" id="{938B7D69-801E-24C9-2F97-6E571BD8D0C2}"/>
+                    </a:ext>
+                  </a:extLst>
+                </p:cNvPr>
+                <p:cNvSpPr/>
+                <p:nvPr/>
+              </p:nvSpPr>
+              <p:spPr>
+                <a:xfrm>
+                  <a:off x="4446125" y="5742731"/>
+                  <a:ext cx="176039" cy="176039"/>
+                </a:xfrm>
+                <a:prstGeom prst="ellipse">
+                  <a:avLst/>
+                </a:prstGeom>
+                <a:solidFill>
+                  <a:schemeClr val="bg1"/>
+                </a:solidFill>
+                <a:ln>
+                  <a:solidFill>
+                    <a:schemeClr val="bg1">
+                      <a:lumMod val="50000"/>
+                    </a:schemeClr>
+                  </a:solidFill>
+                </a:ln>
+              </p:spPr>
+              <p:style>
+                <a:lnRef idx="2">
+                  <a:schemeClr val="accent1">
+                    <a:shade val="50000"/>
+                  </a:schemeClr>
+                </a:lnRef>
+                <a:fillRef idx="1">
+                  <a:schemeClr val="accent1"/>
+                </a:fillRef>
+                <a:effectRef idx="0">
+                  <a:schemeClr val="accent1"/>
+                </a:effectRef>
+                <a:fontRef idx="minor">
+                  <a:schemeClr val="lt1"/>
+                </a:fontRef>
+              </p:style>
+              <p:txBody>
+                <a:bodyPr lIns="0" tIns="0" rIns="0" bIns="0" rtlCol="0" anchor="ctr"/>
+                <a:lstStyle/>
+                <a:p>
+                  <a:pPr algn="ctr"/>
+                  <a:r>
+                    <a:rPr lang="fr-FR" sz="1200" dirty="0">
+                      <a:solidFill>
+                        <a:schemeClr val="bg1">
+                          <a:lumMod val="50000"/>
+                        </a:schemeClr>
+                      </a:solidFill>
+                    </a:rPr>
+                    <a:t>M</a:t>
+                  </a:r>
+                </a:p>
+              </p:txBody>
+            </p:sp>
+            <p:sp>
+              <p:nvSpPr>
+                <p:cNvPr id="1730" name="Rectangle 1729">
+                  <a:extLst>
+                    <a:ext uri="{FF2B5EF4-FFF2-40B4-BE49-F238E27FC236}">
+                      <a16:creationId xmlns:a16="http://schemas.microsoft.com/office/drawing/2014/main" id="{4434EF97-D20D-EE02-4DE3-22909927901D}"/>
+                    </a:ext>
+                  </a:extLst>
+                </p:cNvPr>
+                <p:cNvSpPr/>
+                <p:nvPr/>
+              </p:nvSpPr>
+              <p:spPr>
+                <a:xfrm>
+                  <a:off x="4584104" y="5754275"/>
+                  <a:ext cx="673463" cy="173359"/>
+                </a:xfrm>
+                <a:prstGeom prst="rect">
+                  <a:avLst/>
+                </a:prstGeom>
                 <a:noFill/>
-              </a:ln>
-            </p:spPr>
-            <p:style>
-              <a:lnRef idx="2">
-                <a:schemeClr val="accent1">
-                  <a:shade val="50000"/>
-                </a:schemeClr>
-              </a:lnRef>
-              <a:fillRef idx="1">
-                <a:schemeClr val="accent1"/>
-              </a:fillRef>
-              <a:effectRef idx="0">
-                <a:schemeClr val="accent1"/>
-              </a:effectRef>
-              <a:fontRef idx="minor">
-                <a:schemeClr val="lt1"/>
-              </a:fontRef>
-            </p:style>
-            <p:txBody>
-              <a:bodyPr rtlCol="0" anchor="ctr"/>
-              <a:lstStyle/>
-              <a:p>
-                <a:r>
-                  <a:rPr lang="fr-FR" sz="800" dirty="0">
-                    <a:solidFill>
-                      <a:srgbClr val="002060"/>
-                    </a:solidFill>
-                  </a:rPr>
-                  <a:t>Données</a:t>
-                </a:r>
-              </a:p>
-            </p:txBody>
-          </p:sp>
-        </p:grpSp>
-        <p:grpSp>
-          <p:nvGrpSpPr>
-            <p:cNvPr id="1722" name="Groupe 1721">
-              <a:extLst>
-                <a:ext uri="{FF2B5EF4-FFF2-40B4-BE49-F238E27FC236}">
-                  <a16:creationId xmlns:a16="http://schemas.microsoft.com/office/drawing/2014/main" id="{7DAF258B-2D86-6380-3C30-E2BC3F01E00F}"/>
-                </a:ext>
-              </a:extLst>
-            </p:cNvPr>
-            <p:cNvGrpSpPr/>
-            <p:nvPr/>
-          </p:nvGrpSpPr>
-          <p:grpSpPr>
-            <a:xfrm>
-              <a:off x="4861406" y="5666328"/>
-              <a:ext cx="811442" cy="184903"/>
-              <a:chOff x="4446125" y="5742731"/>
-              <a:chExt cx="811442" cy="184903"/>
-            </a:xfrm>
-          </p:grpSpPr>
-          <p:sp>
-            <p:nvSpPr>
-              <p:cNvPr id="1723" name="Ellipse 1722">
+                <a:ln>
+                  <a:noFill/>
+                </a:ln>
+              </p:spPr>
+              <p:style>
+                <a:lnRef idx="2">
+                  <a:schemeClr val="accent1">
+                    <a:shade val="50000"/>
+                  </a:schemeClr>
+                </a:lnRef>
+                <a:fillRef idx="1">
+                  <a:schemeClr val="accent1"/>
+                </a:fillRef>
+                <a:effectRef idx="0">
+                  <a:schemeClr val="accent1"/>
+                </a:effectRef>
+                <a:fontRef idx="minor">
+                  <a:schemeClr val="lt1"/>
+                </a:fontRef>
+              </p:style>
+              <p:txBody>
+                <a:bodyPr rtlCol="0" anchor="ctr"/>
+                <a:lstStyle/>
+                <a:p>
+                  <a:r>
+                    <a:rPr lang="fr-FR" sz="800" dirty="0">
+                      <a:solidFill>
+                        <a:srgbClr val="002060"/>
+                      </a:solidFill>
+                    </a:rPr>
+                    <a:t>Matériel</a:t>
+                  </a:r>
+                </a:p>
+              </p:txBody>
+            </p:sp>
+          </p:grpSp>
+          <p:grpSp>
+            <p:nvGrpSpPr>
+              <p:cNvPr id="1731" name="Groupe 1730">
                 <a:extLst>
                   <a:ext uri="{FF2B5EF4-FFF2-40B4-BE49-F238E27FC236}">
-                    <a16:creationId xmlns:a16="http://schemas.microsoft.com/office/drawing/2014/main" id="{1020FE9C-F255-4324-E8FC-D5B2186A9D63}"/>
+                    <a16:creationId xmlns:a16="http://schemas.microsoft.com/office/drawing/2014/main" id="{D064743E-DF65-2995-A752-29A2220A1668}"/>
                   </a:ext>
                 </a:extLst>
               </p:cNvPr>
-              <p:cNvSpPr/>
+              <p:cNvGrpSpPr/>
               <p:nvPr/>
-            </p:nvSpPr>
-            <p:spPr>
+            </p:nvGrpSpPr>
+            <p:grpSpPr>
               <a:xfrm>
-                <a:off x="4446125" y="5742731"/>
-                <a:ext cx="176039" cy="176039"/>
+                <a:off x="5566952" y="5438814"/>
+                <a:ext cx="811442" cy="184903"/>
+                <a:chOff x="4446125" y="5742731"/>
+                <a:chExt cx="811442" cy="184903"/>
               </a:xfrm>
-              <a:prstGeom prst="ellipse">
-                <a:avLst/>
-              </a:prstGeom>
-              <a:solidFill>
-                <a:schemeClr val="bg1"/>
-              </a:solidFill>
-              <a:ln>
+            </p:grpSpPr>
+            <p:sp>
+              <p:nvSpPr>
+                <p:cNvPr id="1732" name="Ellipse 1731">
+                  <a:extLst>
+                    <a:ext uri="{FF2B5EF4-FFF2-40B4-BE49-F238E27FC236}">
+                      <a16:creationId xmlns:a16="http://schemas.microsoft.com/office/drawing/2014/main" id="{3B122406-DDA6-1213-F52C-F009A4B962B6}"/>
+                    </a:ext>
+                  </a:extLst>
+                </p:cNvPr>
+                <p:cNvSpPr/>
+                <p:nvPr/>
+              </p:nvSpPr>
+              <p:spPr>
+                <a:xfrm>
+                  <a:off x="4446125" y="5742731"/>
+                  <a:ext cx="176039" cy="176039"/>
+                </a:xfrm>
+                <a:prstGeom prst="ellipse">
+                  <a:avLst/>
+                </a:prstGeom>
                 <a:solidFill>
-                  <a:schemeClr val="bg1">
-                    <a:lumMod val="50000"/>
+                  <a:schemeClr val="bg1"/>
+                </a:solidFill>
+                <a:ln>
+                  <a:solidFill>
+                    <a:schemeClr val="bg1">
+                      <a:lumMod val="50000"/>
+                    </a:schemeClr>
+                  </a:solidFill>
+                </a:ln>
+              </p:spPr>
+              <p:style>
+                <a:lnRef idx="2">
+                  <a:schemeClr val="accent1">
+                    <a:shade val="50000"/>
                   </a:schemeClr>
-                </a:solidFill>
-              </a:ln>
-            </p:spPr>
-            <p:style>
-              <a:lnRef idx="2">
-                <a:schemeClr val="accent1">
-                  <a:shade val="50000"/>
-                </a:schemeClr>
-              </a:lnRef>
-              <a:fillRef idx="1">
-                <a:schemeClr val="accent1"/>
-              </a:fillRef>
-              <a:effectRef idx="0">
-                <a:schemeClr val="accent1"/>
-              </a:effectRef>
-              <a:fontRef idx="minor">
-                <a:schemeClr val="lt1"/>
-              </a:fontRef>
-            </p:style>
-            <p:txBody>
-              <a:bodyPr lIns="0" tIns="0" rIns="0" bIns="0" rtlCol="0" anchor="ctr"/>
-              <a:lstStyle/>
-              <a:p>
-                <a:pPr algn="ctr"/>
-                <a:r>
-                  <a:rPr lang="fr-FR" sz="1200" dirty="0">
-                    <a:solidFill>
-                      <a:schemeClr val="bg1">
-                        <a:lumMod val="50000"/>
-                      </a:schemeClr>
-                    </a:solidFill>
-                  </a:rPr>
-                  <a:t>G</a:t>
-                </a:r>
-              </a:p>
-            </p:txBody>
-          </p:sp>
-          <p:sp>
-            <p:nvSpPr>
-              <p:cNvPr id="1724" name="Rectangle 1723">
-                <a:extLst>
-                  <a:ext uri="{FF2B5EF4-FFF2-40B4-BE49-F238E27FC236}">
-                    <a16:creationId xmlns:a16="http://schemas.microsoft.com/office/drawing/2014/main" id="{9C0E7EF3-F058-0955-96C0-BD5C0077FAE3}"/>
-                  </a:ext>
-                </a:extLst>
-              </p:cNvPr>
-              <p:cNvSpPr/>
-              <p:nvPr/>
-            </p:nvSpPr>
-            <p:spPr>
-              <a:xfrm>
-                <a:off x="4584104" y="5754275"/>
-                <a:ext cx="673463" cy="173359"/>
-              </a:xfrm>
-              <a:prstGeom prst="rect">
-                <a:avLst/>
-              </a:prstGeom>
+                </a:lnRef>
+                <a:fillRef idx="1">
+                  <a:schemeClr val="accent1"/>
+                </a:fillRef>
+                <a:effectRef idx="0">
+                  <a:schemeClr val="accent1"/>
+                </a:effectRef>
+                <a:fontRef idx="minor">
+                  <a:schemeClr val="lt1"/>
+                </a:fontRef>
+              </p:style>
+              <p:txBody>
+                <a:bodyPr lIns="0" tIns="0" rIns="0" bIns="0" rtlCol="0" anchor="ctr"/>
+                <a:lstStyle/>
+                <a:p>
+                  <a:pPr algn="ctr"/>
+                  <a:r>
+                    <a:rPr lang="fr-FR" sz="1200" dirty="0">
+                      <a:solidFill>
+                        <a:schemeClr val="bg1">
+                          <a:lumMod val="50000"/>
+                        </a:schemeClr>
+                      </a:solidFill>
+                    </a:rPr>
+                    <a:t>R</a:t>
+                  </a:r>
+                </a:p>
+              </p:txBody>
+            </p:sp>
+            <p:sp>
+              <p:nvSpPr>
+                <p:cNvPr id="1733" name="Rectangle 1732">
+                  <a:extLst>
+                    <a:ext uri="{FF2B5EF4-FFF2-40B4-BE49-F238E27FC236}">
+                      <a16:creationId xmlns:a16="http://schemas.microsoft.com/office/drawing/2014/main" id="{C33DA745-4DD3-A5C1-EEC7-40E66C950C46}"/>
+                    </a:ext>
+                  </a:extLst>
+                </p:cNvPr>
+                <p:cNvSpPr/>
+                <p:nvPr/>
+              </p:nvSpPr>
+              <p:spPr>
+                <a:xfrm>
+                  <a:off x="4584104" y="5754275"/>
+                  <a:ext cx="673463" cy="173359"/>
+                </a:xfrm>
+                <a:prstGeom prst="rect">
+                  <a:avLst/>
+                </a:prstGeom>
+                <a:noFill/>
+                <a:ln>
+                  <a:noFill/>
+                </a:ln>
+              </p:spPr>
+              <p:style>
+                <a:lnRef idx="2">
+                  <a:schemeClr val="accent1">
+                    <a:shade val="50000"/>
+                  </a:schemeClr>
+                </a:lnRef>
+                <a:fillRef idx="1">
+                  <a:schemeClr val="accent1"/>
+                </a:fillRef>
+                <a:effectRef idx="0">
+                  <a:schemeClr val="accent1"/>
+                </a:effectRef>
+                <a:fontRef idx="minor">
+                  <a:schemeClr val="lt1"/>
+                </a:fontRef>
+              </p:style>
+              <p:txBody>
+                <a:bodyPr rtlCol="0" anchor="ctr"/>
+                <a:lstStyle/>
+                <a:p>
+                  <a:r>
+                    <a:rPr lang="fr-FR" sz="800" dirty="0">
+                      <a:solidFill>
+                        <a:srgbClr val="002060"/>
+                      </a:solidFill>
+                    </a:rPr>
+                    <a:t>Recherche</a:t>
+                  </a:r>
+                </a:p>
+              </p:txBody>
+            </p:sp>
+          </p:grpSp>
+        </p:grpSp>
+        <p:sp>
+          <p:nvSpPr>
+            <p:cNvPr id="2" name="Rectangle 1">
+              <a:extLst>
+                <a:ext uri="{FF2B5EF4-FFF2-40B4-BE49-F238E27FC236}">
+                  <a16:creationId xmlns:a16="http://schemas.microsoft.com/office/drawing/2014/main" id="{E7FD5141-8C73-B96A-011B-5840FD62B8C4}"/>
+                </a:ext>
+              </a:extLst>
+            </p:cNvPr>
+            <p:cNvSpPr/>
+            <p:nvPr/>
+          </p:nvSpPr>
+          <p:spPr>
+            <a:xfrm>
+              <a:off x="6382247" y="5414032"/>
+              <a:ext cx="673463" cy="173359"/>
+            </a:xfrm>
+            <a:prstGeom prst="rect">
+              <a:avLst/>
+            </a:prstGeom>
+            <a:noFill/>
+            <a:ln>
               <a:noFill/>
-              <a:ln>
-                <a:noFill/>
-              </a:ln>
-            </p:spPr>
-            <p:style>
-              <a:lnRef idx="2">
-                <a:schemeClr val="accent1">
-                  <a:shade val="50000"/>
-                </a:schemeClr>
-              </a:lnRef>
-              <a:fillRef idx="1">
-                <a:schemeClr val="accent1"/>
-              </a:fillRef>
-              <a:effectRef idx="0">
-                <a:schemeClr val="accent1"/>
-              </a:effectRef>
-              <a:fontRef idx="minor">
-                <a:schemeClr val="lt1"/>
-              </a:fontRef>
-            </p:style>
-            <p:txBody>
-              <a:bodyPr rtlCol="0" anchor="ctr"/>
-              <a:lstStyle/>
-              <a:p>
-                <a:r>
-                  <a:rPr lang="fr-FR" sz="800" dirty="0">
-                    <a:solidFill>
-                      <a:srgbClr val="002060"/>
-                    </a:solidFill>
-                  </a:rPr>
-                  <a:t>Gestion</a:t>
-                </a:r>
-              </a:p>
-            </p:txBody>
-          </p:sp>
-        </p:grpSp>
-        <p:grpSp>
-          <p:nvGrpSpPr>
-            <p:cNvPr id="1725" name="Groupe 1724">
-              <a:extLst>
-                <a:ext uri="{FF2B5EF4-FFF2-40B4-BE49-F238E27FC236}">
-                  <a16:creationId xmlns:a16="http://schemas.microsoft.com/office/drawing/2014/main" id="{27CBF04C-A11A-63EE-0787-EC0192FC77A6}"/>
-                </a:ext>
-              </a:extLst>
-            </p:cNvPr>
-            <p:cNvGrpSpPr/>
-            <p:nvPr/>
-          </p:nvGrpSpPr>
-          <p:grpSpPr>
-            <a:xfrm>
-              <a:off x="4862167" y="5888577"/>
-              <a:ext cx="811442" cy="184903"/>
-              <a:chOff x="4446125" y="5742731"/>
-              <a:chExt cx="811442" cy="184903"/>
-            </a:xfrm>
-          </p:grpSpPr>
-          <p:sp>
-            <p:nvSpPr>
-              <p:cNvPr id="1726" name="Ellipse 1725">
-                <a:extLst>
-                  <a:ext uri="{FF2B5EF4-FFF2-40B4-BE49-F238E27FC236}">
-                    <a16:creationId xmlns:a16="http://schemas.microsoft.com/office/drawing/2014/main" id="{B9032987-3C1F-CFAB-57BC-6A02B5DDAA79}"/>
-                  </a:ext>
-                </a:extLst>
-              </p:cNvPr>
-              <p:cNvSpPr/>
-              <p:nvPr/>
-            </p:nvSpPr>
-            <p:spPr>
-              <a:xfrm>
-                <a:off x="4446125" y="5742731"/>
-                <a:ext cx="176039" cy="176039"/>
-              </a:xfrm>
-              <a:prstGeom prst="ellipse">
-                <a:avLst/>
-              </a:prstGeom>
-              <a:solidFill>
-                <a:schemeClr val="bg1"/>
-              </a:solidFill>
-              <a:ln>
-                <a:solidFill>
-                  <a:schemeClr val="bg1">
-                    <a:lumMod val="50000"/>
-                  </a:schemeClr>
-                </a:solidFill>
-              </a:ln>
-            </p:spPr>
-            <p:style>
-              <a:lnRef idx="2">
-                <a:schemeClr val="accent1">
-                  <a:shade val="50000"/>
-                </a:schemeClr>
-              </a:lnRef>
-              <a:fillRef idx="1">
-                <a:schemeClr val="accent1"/>
-              </a:fillRef>
-              <a:effectRef idx="0">
-                <a:schemeClr val="accent1"/>
-              </a:effectRef>
-              <a:fontRef idx="minor">
-                <a:schemeClr val="lt1"/>
-              </a:fontRef>
-            </p:style>
-            <p:txBody>
-              <a:bodyPr lIns="0" tIns="0" rIns="0" bIns="0" rtlCol="0" anchor="ctr"/>
-              <a:lstStyle/>
-              <a:p>
-                <a:pPr algn="ctr"/>
-                <a:r>
-                  <a:rPr lang="fr-FR" sz="1200" dirty="0">
-                    <a:solidFill>
-                      <a:schemeClr val="bg1">
-                        <a:lumMod val="50000"/>
-                      </a:schemeClr>
-                    </a:solidFill>
-                  </a:rPr>
-                  <a:t>I</a:t>
-                </a:r>
-              </a:p>
-            </p:txBody>
-          </p:sp>
-          <p:sp>
-            <p:nvSpPr>
-              <p:cNvPr id="1727" name="Rectangle 1726">
-                <a:extLst>
-                  <a:ext uri="{FF2B5EF4-FFF2-40B4-BE49-F238E27FC236}">
-                    <a16:creationId xmlns:a16="http://schemas.microsoft.com/office/drawing/2014/main" id="{CC343B79-8594-DF92-C703-96C7E1AD2337}"/>
-                  </a:ext>
-                </a:extLst>
-              </p:cNvPr>
-              <p:cNvSpPr/>
-              <p:nvPr/>
-            </p:nvSpPr>
-            <p:spPr>
-              <a:xfrm>
-                <a:off x="4584104" y="5754275"/>
-                <a:ext cx="673463" cy="173359"/>
-              </a:xfrm>
-              <a:prstGeom prst="rect">
-                <a:avLst/>
-              </a:prstGeom>
-              <a:noFill/>
-              <a:ln>
-                <a:noFill/>
-              </a:ln>
-            </p:spPr>
-            <p:style>
-              <a:lnRef idx="2">
-                <a:schemeClr val="accent1">
-                  <a:shade val="50000"/>
-                </a:schemeClr>
-              </a:lnRef>
-              <a:fillRef idx="1">
-                <a:schemeClr val="accent1"/>
-              </a:fillRef>
-              <a:effectRef idx="0">
-                <a:schemeClr val="accent1"/>
-              </a:effectRef>
-              <a:fontRef idx="minor">
-                <a:schemeClr val="lt1"/>
-              </a:fontRef>
-            </p:style>
-            <p:txBody>
-              <a:bodyPr rtlCol="0" anchor="ctr"/>
-              <a:lstStyle/>
-              <a:p>
-                <a:r>
-                  <a:rPr lang="fr-FR" sz="800" dirty="0">
-                    <a:solidFill>
-                      <a:srgbClr val="002060"/>
-                    </a:solidFill>
-                  </a:rPr>
-                  <a:t>Influence</a:t>
-                </a:r>
-              </a:p>
-            </p:txBody>
-          </p:sp>
-        </p:grpSp>
-        <p:grpSp>
-          <p:nvGrpSpPr>
-            <p:cNvPr id="1728" name="Groupe 1727">
-              <a:extLst>
-                <a:ext uri="{FF2B5EF4-FFF2-40B4-BE49-F238E27FC236}">
-                  <a16:creationId xmlns:a16="http://schemas.microsoft.com/office/drawing/2014/main" id="{A514F01E-BEBA-83A6-E9DC-A66599FB2411}"/>
-                </a:ext>
-              </a:extLst>
-            </p:cNvPr>
-            <p:cNvGrpSpPr/>
-            <p:nvPr/>
-          </p:nvGrpSpPr>
-          <p:grpSpPr>
-            <a:xfrm>
-              <a:off x="5577570" y="5219658"/>
-              <a:ext cx="811442" cy="184903"/>
-              <a:chOff x="4446125" y="5742731"/>
-              <a:chExt cx="811442" cy="184903"/>
-            </a:xfrm>
-          </p:grpSpPr>
-          <p:sp>
-            <p:nvSpPr>
-              <p:cNvPr id="1729" name="Ellipse 1728">
-                <a:extLst>
-                  <a:ext uri="{FF2B5EF4-FFF2-40B4-BE49-F238E27FC236}">
-                    <a16:creationId xmlns:a16="http://schemas.microsoft.com/office/drawing/2014/main" id="{938B7D69-801E-24C9-2F97-6E571BD8D0C2}"/>
-                  </a:ext>
-                </a:extLst>
-              </p:cNvPr>
-              <p:cNvSpPr/>
-              <p:nvPr/>
-            </p:nvSpPr>
-            <p:spPr>
-              <a:xfrm>
-                <a:off x="4446125" y="5742731"/>
-                <a:ext cx="176039" cy="176039"/>
-              </a:xfrm>
-              <a:prstGeom prst="ellipse">
-                <a:avLst/>
-              </a:prstGeom>
-              <a:solidFill>
-                <a:schemeClr val="bg1"/>
-              </a:solidFill>
-              <a:ln>
-                <a:solidFill>
-                  <a:schemeClr val="bg1">
-                    <a:lumMod val="50000"/>
-                  </a:schemeClr>
-                </a:solidFill>
-              </a:ln>
-            </p:spPr>
-            <p:style>
-              <a:lnRef idx="2">
-                <a:schemeClr val="accent1">
-                  <a:shade val="50000"/>
-                </a:schemeClr>
-              </a:lnRef>
-              <a:fillRef idx="1">
-                <a:schemeClr val="accent1"/>
-              </a:fillRef>
-              <a:effectRef idx="0">
-                <a:schemeClr val="accent1"/>
-              </a:effectRef>
-              <a:fontRef idx="minor">
-                <a:schemeClr val="lt1"/>
-              </a:fontRef>
-            </p:style>
-            <p:txBody>
-              <a:bodyPr lIns="0" tIns="0" rIns="0" bIns="0" rtlCol="0" anchor="ctr"/>
-              <a:lstStyle/>
-              <a:p>
-                <a:pPr algn="ctr"/>
-                <a:r>
-                  <a:rPr lang="fr-FR" sz="1200" dirty="0">
-                    <a:solidFill>
-                      <a:schemeClr val="bg1">
-                        <a:lumMod val="50000"/>
-                      </a:schemeClr>
-                    </a:solidFill>
-                  </a:rPr>
-                  <a:t>M</a:t>
-                </a:r>
-              </a:p>
-            </p:txBody>
-          </p:sp>
-          <p:sp>
-            <p:nvSpPr>
-              <p:cNvPr id="1730" name="Rectangle 1729">
-                <a:extLst>
-                  <a:ext uri="{FF2B5EF4-FFF2-40B4-BE49-F238E27FC236}">
-                    <a16:creationId xmlns:a16="http://schemas.microsoft.com/office/drawing/2014/main" id="{4434EF97-D20D-EE02-4DE3-22909927901D}"/>
-                  </a:ext>
-                </a:extLst>
-              </p:cNvPr>
-              <p:cNvSpPr/>
-              <p:nvPr/>
-            </p:nvSpPr>
-            <p:spPr>
-              <a:xfrm>
-                <a:off x="4584104" y="5754275"/>
-                <a:ext cx="673463" cy="173359"/>
-              </a:xfrm>
-              <a:prstGeom prst="rect">
-                <a:avLst/>
-              </a:prstGeom>
-              <a:noFill/>
-              <a:ln>
-                <a:noFill/>
-              </a:ln>
-            </p:spPr>
-            <p:style>
-              <a:lnRef idx="2">
-                <a:schemeClr val="accent1">
-                  <a:shade val="50000"/>
-                </a:schemeClr>
-              </a:lnRef>
-              <a:fillRef idx="1">
-                <a:schemeClr val="accent1"/>
-              </a:fillRef>
-              <a:effectRef idx="0">
-                <a:schemeClr val="accent1"/>
-              </a:effectRef>
-              <a:fontRef idx="minor">
-                <a:schemeClr val="lt1"/>
-              </a:fontRef>
-            </p:style>
-            <p:txBody>
-              <a:bodyPr rtlCol="0" anchor="ctr"/>
-              <a:lstStyle/>
-              <a:p>
-                <a:r>
-                  <a:rPr lang="fr-FR" sz="800" dirty="0">
-                    <a:solidFill>
-                      <a:srgbClr val="002060"/>
-                    </a:solidFill>
-                  </a:rPr>
-                  <a:t>Matériel</a:t>
-                </a:r>
-              </a:p>
-            </p:txBody>
-          </p:sp>
-        </p:grpSp>
-        <p:grpSp>
-          <p:nvGrpSpPr>
-            <p:cNvPr id="1731" name="Groupe 1730">
-              <a:extLst>
-                <a:ext uri="{FF2B5EF4-FFF2-40B4-BE49-F238E27FC236}">
-                  <a16:creationId xmlns:a16="http://schemas.microsoft.com/office/drawing/2014/main" id="{D064743E-DF65-2995-A752-29A2220A1668}"/>
-                </a:ext>
-              </a:extLst>
-            </p:cNvPr>
-            <p:cNvGrpSpPr/>
-            <p:nvPr/>
-          </p:nvGrpSpPr>
-          <p:grpSpPr>
-            <a:xfrm>
-              <a:off x="5566952" y="5438814"/>
-              <a:ext cx="811442" cy="184903"/>
-              <a:chOff x="4446125" y="5742731"/>
-              <a:chExt cx="811442" cy="184903"/>
-            </a:xfrm>
-          </p:grpSpPr>
-          <p:sp>
-            <p:nvSpPr>
-              <p:cNvPr id="1732" name="Ellipse 1731">
-                <a:extLst>
-                  <a:ext uri="{FF2B5EF4-FFF2-40B4-BE49-F238E27FC236}">
-                    <a16:creationId xmlns:a16="http://schemas.microsoft.com/office/drawing/2014/main" id="{3B122406-DDA6-1213-F52C-F009A4B962B6}"/>
-                  </a:ext>
-                </a:extLst>
-              </p:cNvPr>
-              <p:cNvSpPr/>
-              <p:nvPr/>
-            </p:nvSpPr>
-            <p:spPr>
-              <a:xfrm>
-                <a:off x="4446125" y="5742731"/>
-                <a:ext cx="176039" cy="176039"/>
-              </a:xfrm>
-              <a:prstGeom prst="ellipse">
-                <a:avLst/>
-              </a:prstGeom>
-              <a:solidFill>
-                <a:schemeClr val="bg1"/>
-              </a:solidFill>
-              <a:ln>
-                <a:solidFill>
-                  <a:schemeClr val="bg1">
-                    <a:lumMod val="50000"/>
-                  </a:schemeClr>
-                </a:solidFill>
-              </a:ln>
-            </p:spPr>
-            <p:style>
-              <a:lnRef idx="2">
-                <a:schemeClr val="accent1">
-                  <a:shade val="50000"/>
-                </a:schemeClr>
-              </a:lnRef>
-              <a:fillRef idx="1">
-                <a:schemeClr val="accent1"/>
-              </a:fillRef>
-              <a:effectRef idx="0">
-                <a:schemeClr val="accent1"/>
-              </a:effectRef>
-              <a:fontRef idx="minor">
-                <a:schemeClr val="lt1"/>
-              </a:fontRef>
-            </p:style>
-            <p:txBody>
-              <a:bodyPr lIns="0" tIns="0" rIns="0" bIns="0" rtlCol="0" anchor="ctr"/>
-              <a:lstStyle/>
-              <a:p>
-                <a:pPr algn="ctr"/>
-                <a:r>
-                  <a:rPr lang="fr-FR" sz="1200" dirty="0">
-                    <a:solidFill>
-                      <a:schemeClr val="bg1">
-                        <a:lumMod val="50000"/>
-                      </a:schemeClr>
-                    </a:solidFill>
-                  </a:rPr>
-                  <a:t>R</a:t>
-                </a:r>
-              </a:p>
-            </p:txBody>
-          </p:sp>
-          <p:sp>
-            <p:nvSpPr>
-              <p:cNvPr id="1733" name="Rectangle 1732">
-                <a:extLst>
-                  <a:ext uri="{FF2B5EF4-FFF2-40B4-BE49-F238E27FC236}">
-                    <a16:creationId xmlns:a16="http://schemas.microsoft.com/office/drawing/2014/main" id="{C33DA745-4DD3-A5C1-EEC7-40E66C950C46}"/>
-                  </a:ext>
-                </a:extLst>
-              </p:cNvPr>
-              <p:cNvSpPr/>
-              <p:nvPr/>
-            </p:nvSpPr>
-            <p:spPr>
-              <a:xfrm>
-                <a:off x="4584104" y="5754275"/>
-                <a:ext cx="673463" cy="173359"/>
-              </a:xfrm>
-              <a:prstGeom prst="rect">
-                <a:avLst/>
-              </a:prstGeom>
-              <a:noFill/>
-              <a:ln>
-                <a:noFill/>
-              </a:ln>
-            </p:spPr>
-            <p:style>
-              <a:lnRef idx="2">
-                <a:schemeClr val="accent1">
-                  <a:shade val="50000"/>
-                </a:schemeClr>
-              </a:lnRef>
-              <a:fillRef idx="1">
-                <a:schemeClr val="accent1"/>
-              </a:fillRef>
-              <a:effectRef idx="0">
-                <a:schemeClr val="accent1"/>
-              </a:effectRef>
-              <a:fontRef idx="minor">
-                <a:schemeClr val="lt1"/>
-              </a:fontRef>
-            </p:style>
-            <p:txBody>
-              <a:bodyPr rtlCol="0" anchor="ctr"/>
-              <a:lstStyle/>
-              <a:p>
-                <a:r>
-                  <a:rPr lang="fr-FR" sz="800" dirty="0">
-                    <a:solidFill>
-                      <a:srgbClr val="002060"/>
-                    </a:solidFill>
-                  </a:rPr>
-                  <a:t>Recherche</a:t>
-                </a:r>
-              </a:p>
-            </p:txBody>
-          </p:sp>
-        </p:grpSp>
+            </a:ln>
+          </p:spPr>
+          <p:style>
+            <a:lnRef idx="2">
+              <a:schemeClr val="accent1">
+                <a:shade val="50000"/>
+              </a:schemeClr>
+            </a:lnRef>
+            <a:fillRef idx="1">
+              <a:schemeClr val="accent1"/>
+            </a:fillRef>
+            <a:effectRef idx="0">
+              <a:schemeClr val="accent1"/>
+            </a:effectRef>
+            <a:fontRef idx="minor">
+              <a:schemeClr val="lt1"/>
+            </a:fontRef>
+          </p:style>
+          <p:txBody>
+            <a:bodyPr rtlCol="0" anchor="ctr"/>
+            <a:lstStyle/>
+            <a:p>
+              <a:r>
+                <a:rPr lang="fr-FR" sz="1050" b="1" i="1" dirty="0">
+                  <a:solidFill>
+                    <a:srgbClr val="002060"/>
+                  </a:solidFill>
+                </a:rPr>
+                <a:t>Flux</a:t>
+              </a:r>
+            </a:p>
+          </p:txBody>
+        </p:sp>
       </p:grpSp>
     </p:spTree>
     <p:extLst>

</xml_diff>